<commit_message>
Updated logo and app display name
</commit_message>
<xml_diff>
--- a/Misc/logo.pptx
+++ b/Misc/logo.pptx
@@ -6,6 +6,7 @@
   </p:sldMasterIdLst>
   <p:sldIdLst>
     <p:sldId id="256" r:id="rId2"/>
+    <p:sldId id="257" r:id="rId3"/>
   </p:sldIdLst>
   <p:sldSz cx="12192000" cy="6858000"/>
   <p:notesSz cx="6858000" cy="9144000"/>
@@ -104,6 +105,11 @@
       </a:defRPr>
     </a:lvl9pPr>
   </p:defaultTextStyle>
+  <p:extLst>
+    <p:ext uri="{EFAFB233-063F-42B5-8137-9DF3F51BA10A}">
+      <p15:sldGuideLst xmlns:p15="http://schemas.microsoft.com/office/powerpoint/2012/main"/>
+    </p:ext>
+  </p:extLst>
 </p:presentation>
 </file>
 
@@ -254,7 +260,7 @@
           <a:p>
             <a:fld id="{5B97FC3E-105F-AC47-8D27-0EC49D06E29E}" type="datetimeFigureOut">
               <a:rPr lang="en-US" smtClean="0"/>
-              <a:t>4/17/20</a:t>
+              <a:t>5/3/20</a:t>
             </a:fld>
             <a:endParaRPr lang="en-US"/>
           </a:p>
@@ -452,7 +458,7 @@
           <a:p>
             <a:fld id="{5B97FC3E-105F-AC47-8D27-0EC49D06E29E}" type="datetimeFigureOut">
               <a:rPr lang="en-US" smtClean="0"/>
-              <a:t>4/17/20</a:t>
+              <a:t>5/3/20</a:t>
             </a:fld>
             <a:endParaRPr lang="en-US"/>
           </a:p>
@@ -660,7 +666,7 @@
           <a:p>
             <a:fld id="{5B97FC3E-105F-AC47-8D27-0EC49D06E29E}" type="datetimeFigureOut">
               <a:rPr lang="en-US" smtClean="0"/>
-              <a:t>4/17/20</a:t>
+              <a:t>5/3/20</a:t>
             </a:fld>
             <a:endParaRPr lang="en-US"/>
           </a:p>
@@ -858,7 +864,7 @@
           <a:p>
             <a:fld id="{5B97FC3E-105F-AC47-8D27-0EC49D06E29E}" type="datetimeFigureOut">
               <a:rPr lang="en-US" smtClean="0"/>
-              <a:t>4/17/20</a:t>
+              <a:t>5/3/20</a:t>
             </a:fld>
             <a:endParaRPr lang="en-US"/>
           </a:p>
@@ -1133,7 +1139,7 @@
           <a:p>
             <a:fld id="{5B97FC3E-105F-AC47-8D27-0EC49D06E29E}" type="datetimeFigureOut">
               <a:rPr lang="en-US" smtClean="0"/>
-              <a:t>4/17/20</a:t>
+              <a:t>5/3/20</a:t>
             </a:fld>
             <a:endParaRPr lang="en-US"/>
           </a:p>
@@ -1398,7 +1404,7 @@
           <a:p>
             <a:fld id="{5B97FC3E-105F-AC47-8D27-0EC49D06E29E}" type="datetimeFigureOut">
               <a:rPr lang="en-US" smtClean="0"/>
-              <a:t>4/17/20</a:t>
+              <a:t>5/3/20</a:t>
             </a:fld>
             <a:endParaRPr lang="en-US"/>
           </a:p>
@@ -1810,7 +1816,7 @@
           <a:p>
             <a:fld id="{5B97FC3E-105F-AC47-8D27-0EC49D06E29E}" type="datetimeFigureOut">
               <a:rPr lang="en-US" smtClean="0"/>
-              <a:t>4/17/20</a:t>
+              <a:t>5/3/20</a:t>
             </a:fld>
             <a:endParaRPr lang="en-US"/>
           </a:p>
@@ -1951,7 +1957,7 @@
           <a:p>
             <a:fld id="{5B97FC3E-105F-AC47-8D27-0EC49D06E29E}" type="datetimeFigureOut">
               <a:rPr lang="en-US" smtClean="0"/>
-              <a:t>4/17/20</a:t>
+              <a:t>5/3/20</a:t>
             </a:fld>
             <a:endParaRPr lang="en-US"/>
           </a:p>
@@ -2064,7 +2070,7 @@
           <a:p>
             <a:fld id="{5B97FC3E-105F-AC47-8D27-0EC49D06E29E}" type="datetimeFigureOut">
               <a:rPr lang="en-US" smtClean="0"/>
-              <a:t>4/17/20</a:t>
+              <a:t>5/3/20</a:t>
             </a:fld>
             <a:endParaRPr lang="en-US"/>
           </a:p>
@@ -2375,7 +2381,7 @@
           <a:p>
             <a:fld id="{5B97FC3E-105F-AC47-8D27-0EC49D06E29E}" type="datetimeFigureOut">
               <a:rPr lang="en-US" smtClean="0"/>
-              <a:t>4/17/20</a:t>
+              <a:t>5/3/20</a:t>
             </a:fld>
             <a:endParaRPr lang="en-US"/>
           </a:p>
@@ -2663,7 +2669,7 @@
           <a:p>
             <a:fld id="{5B97FC3E-105F-AC47-8D27-0EC49D06E29E}" type="datetimeFigureOut">
               <a:rPr lang="en-US" smtClean="0"/>
-              <a:t>4/17/20</a:t>
+              <a:t>5/3/20</a:t>
             </a:fld>
             <a:endParaRPr lang="en-US"/>
           </a:p>
@@ -2904,7 +2910,7 @@
           <a:p>
             <a:fld id="{5B97FC3E-105F-AC47-8D27-0EC49D06E29E}" type="datetimeFigureOut">
               <a:rPr lang="en-US" smtClean="0"/>
-              <a:t>4/17/20</a:t>
+              <a:t>5/3/20</a:t>
             </a:fld>
             <a:endParaRPr lang="en-US"/>
           </a:p>
@@ -3445,6 +3451,285 @@
 </p:sld>
 </file>
 
+<file path=ppt/slides/slide2.xml><?xml version="1.0" encoding="utf-8"?>
+<p:sld xmlns:a="http://schemas.openxmlformats.org/drawingml/2006/main" xmlns:r="http://schemas.openxmlformats.org/officeDocument/2006/relationships" xmlns:p="http://schemas.openxmlformats.org/presentationml/2006/main">
+  <p:cSld>
+    <p:spTree>
+      <p:nvGrpSpPr>
+        <p:cNvPr id="1" name=""/>
+        <p:cNvGrpSpPr/>
+        <p:nvPr/>
+      </p:nvGrpSpPr>
+      <p:grpSpPr>
+        <a:xfrm>
+          <a:off x="0" y="0"/>
+          <a:ext cx="0" cy="0"/>
+          <a:chOff x="0" y="0"/>
+          <a:chExt cx="0" cy="0"/>
+        </a:xfrm>
+      </p:grpSpPr>
+      <p:sp>
+        <p:nvSpPr>
+          <p:cNvPr id="11" name="Rounded Rectangle 10">
+            <a:extLst>
+              <a:ext uri="{FF2B5EF4-FFF2-40B4-BE49-F238E27FC236}">
+                <a16:creationId xmlns:a16="http://schemas.microsoft.com/office/drawing/2014/main" id="{EF0996B6-3106-A840-9E31-5209804927D1}"/>
+              </a:ext>
+            </a:extLst>
+          </p:cNvPr>
+          <p:cNvSpPr/>
+          <p:nvPr/>
+        </p:nvSpPr>
+        <p:spPr>
+          <a:xfrm>
+            <a:off x="3313218" y="601180"/>
+            <a:ext cx="5248704" cy="5248704"/>
+          </a:xfrm>
+          <a:prstGeom prst="roundRect">
+            <a:avLst/>
+          </a:prstGeom>
+          <a:gradFill flip="none" rotWithShape="1">
+            <a:gsLst>
+              <a:gs pos="100000">
+                <a:schemeClr val="accent2"/>
+              </a:gs>
+              <a:gs pos="0">
+                <a:schemeClr val="bg1"/>
+              </a:gs>
+              <a:gs pos="0">
+                <a:schemeClr val="accent2"/>
+              </a:gs>
+              <a:gs pos="100000">
+                <a:schemeClr val="bg1"/>
+              </a:gs>
+            </a:gsLst>
+            <a:lin ang="5400000" scaled="0"/>
+            <a:tileRect/>
+          </a:gradFill>
+          <a:ln w="28575">
+            <a:solidFill>
+              <a:schemeClr val="accent2"/>
+            </a:solidFill>
+          </a:ln>
+        </p:spPr>
+        <p:style>
+          <a:lnRef idx="2">
+            <a:schemeClr val="accent6"/>
+          </a:lnRef>
+          <a:fillRef idx="1">
+            <a:schemeClr val="lt1"/>
+          </a:fillRef>
+          <a:effectRef idx="0">
+            <a:schemeClr val="accent6"/>
+          </a:effectRef>
+          <a:fontRef idx="minor">
+            <a:schemeClr val="dk1"/>
+          </a:fontRef>
+        </p:style>
+        <p:txBody>
+          <a:bodyPr rtlCol="0" anchor="ctr"/>
+          <a:lstStyle/>
+          <a:p>
+            <a:pPr algn="ctr"/>
+            <a:endParaRPr lang="en-US"/>
+          </a:p>
+        </p:txBody>
+      </p:sp>
+      <p:sp>
+        <p:nvSpPr>
+          <p:cNvPr id="4" name="Rectangle 3">
+            <a:extLst>
+              <a:ext uri="{FF2B5EF4-FFF2-40B4-BE49-F238E27FC236}">
+                <a16:creationId xmlns:a16="http://schemas.microsoft.com/office/drawing/2014/main" id="{5A0D28D6-AFDD-2743-B072-17095E30DEC8}"/>
+              </a:ext>
+            </a:extLst>
+          </p:cNvPr>
+          <p:cNvSpPr/>
+          <p:nvPr/>
+        </p:nvSpPr>
+        <p:spPr>
+          <a:xfrm>
+            <a:off x="3601409" y="691046"/>
+            <a:ext cx="3310511" cy="3939540"/>
+          </a:xfrm>
+          <a:prstGeom prst="rect">
+            <a:avLst/>
+          </a:prstGeom>
+          <a:noFill/>
+          <a:effectLst>
+            <a:outerShdw dist="50800" sx="112000" sy="112000" algn="ctr" rotWithShape="0">
+              <a:srgbClr val="000000">
+                <a:alpha val="55000"/>
+              </a:srgbClr>
+            </a:outerShdw>
+          </a:effectLst>
+        </p:spPr>
+        <p:txBody>
+          <a:bodyPr wrap="square" lIns="91440" tIns="45720" rIns="91440" bIns="45720">
+            <a:spAutoFit/>
+          </a:bodyPr>
+          <a:lstStyle/>
+          <a:p>
+            <a:pPr algn="ctr"/>
+            <a:r>
+              <a:rPr lang="en-US" sz="25000" b="1" i="1" dirty="0">
+                <a:ln w="0"/>
+                <a:solidFill>
+                  <a:schemeClr val="bg1"/>
+                </a:solidFill>
+              </a:rPr>
+              <a:t>W</a:t>
+            </a:r>
+          </a:p>
+        </p:txBody>
+      </p:sp>
+      <p:sp>
+        <p:nvSpPr>
+          <p:cNvPr id="6" name="Rectangle 5">
+            <a:extLst>
+              <a:ext uri="{FF2B5EF4-FFF2-40B4-BE49-F238E27FC236}">
+                <a16:creationId xmlns:a16="http://schemas.microsoft.com/office/drawing/2014/main" id="{F874D716-600B-7D49-995B-C5C7C75C1851}"/>
+              </a:ext>
+            </a:extLst>
+          </p:cNvPr>
+          <p:cNvSpPr/>
+          <p:nvPr/>
+        </p:nvSpPr>
+        <p:spPr>
+          <a:xfrm>
+            <a:off x="5937570" y="2000210"/>
+            <a:ext cx="1840568" cy="3939540"/>
+          </a:xfrm>
+          <a:prstGeom prst="rect">
+            <a:avLst/>
+          </a:prstGeom>
+          <a:noFill/>
+        </p:spPr>
+        <p:txBody>
+          <a:bodyPr wrap="none" lIns="91440" tIns="45720" rIns="91440" bIns="45720">
+            <a:spAutoFit/>
+          </a:bodyPr>
+          <a:lstStyle/>
+          <a:p>
+            <a:pPr algn="ctr"/>
+            <a:r>
+              <a:rPr lang="en-US" sz="25000" i="1" dirty="0">
+                <a:ln w="0"/>
+                <a:solidFill>
+                  <a:schemeClr val="bg1"/>
+                </a:solidFill>
+              </a:rPr>
+              <a:t>P</a:t>
+            </a:r>
+          </a:p>
+        </p:txBody>
+      </p:sp>
+      <p:sp>
+        <p:nvSpPr>
+          <p:cNvPr id="16" name="Oval 15">
+            <a:extLst>
+              <a:ext uri="{FF2B5EF4-FFF2-40B4-BE49-F238E27FC236}">
+                <a16:creationId xmlns:a16="http://schemas.microsoft.com/office/drawing/2014/main" id="{EE8267D0-83F6-4941-A1E1-9184F5387F9D}"/>
+              </a:ext>
+            </a:extLst>
+          </p:cNvPr>
+          <p:cNvSpPr/>
+          <p:nvPr/>
+        </p:nvSpPr>
+        <p:spPr>
+          <a:xfrm>
+            <a:off x="6495666" y="3061673"/>
+            <a:ext cx="1402371" cy="1402371"/>
+          </a:xfrm>
+          <a:prstGeom prst="ellipse">
+            <a:avLst/>
+          </a:prstGeom>
+          <a:solidFill>
+            <a:schemeClr val="accent2"/>
+          </a:solidFill>
+          <a:ln w="149225">
+            <a:solidFill>
+              <a:schemeClr val="bg1"/>
+            </a:solidFill>
+          </a:ln>
+          <a:effectLst>
+            <a:outerShdw sx="1000" sy="1000" algn="ctr" rotWithShape="0">
+              <a:srgbClr val="000000"/>
+            </a:outerShdw>
+          </a:effectLst>
+        </p:spPr>
+        <p:style>
+          <a:lnRef idx="2">
+            <a:schemeClr val="accent6"/>
+          </a:lnRef>
+          <a:fillRef idx="1">
+            <a:schemeClr val="lt1"/>
+          </a:fillRef>
+          <a:effectRef idx="0">
+            <a:schemeClr val="accent6"/>
+          </a:effectRef>
+          <a:fontRef idx="minor">
+            <a:schemeClr val="dk1"/>
+          </a:fontRef>
+        </p:style>
+        <p:txBody>
+          <a:bodyPr rtlCol="0" anchor="ctr"/>
+          <a:lstStyle/>
+          <a:p>
+            <a:pPr algn="ctr"/>
+            <a:endParaRPr lang="en-US"/>
+          </a:p>
+        </p:txBody>
+      </p:sp>
+      <p:pic>
+        <p:nvPicPr>
+          <p:cNvPr id="15" name="Graphic 14" descr="Popcorn">
+            <a:extLst>
+              <a:ext uri="{FF2B5EF4-FFF2-40B4-BE49-F238E27FC236}">
+                <a16:creationId xmlns:a16="http://schemas.microsoft.com/office/drawing/2014/main" id="{E17E3298-325C-DD43-91A5-F3D27D01A505}"/>
+              </a:ext>
+            </a:extLst>
+          </p:cNvPr>
+          <p:cNvPicPr>
+            <a:picLocks noChangeAspect="1"/>
+          </p:cNvPicPr>
+          <p:nvPr/>
+        </p:nvPicPr>
+        <p:blipFill>
+          <a:blip r:embed="rId2">
+            <a:extLst>
+              <a:ext uri="{96DAC541-7B7A-43D3-8B79-37D633B846F1}">
+                <asvg:svgBlip xmlns:asvg="http://schemas.microsoft.com/office/drawing/2016/SVG/main" r:embed="rId3"/>
+              </a:ext>
+            </a:extLst>
+          </a:blip>
+          <a:stretch>
+            <a:fillRect/>
+          </a:stretch>
+        </p:blipFill>
+        <p:spPr>
+          <a:xfrm>
+            <a:off x="6643083" y="3225532"/>
+            <a:ext cx="1074652" cy="1074652"/>
+          </a:xfrm>
+          <a:prstGeom prst="rect">
+            <a:avLst/>
+          </a:prstGeom>
+        </p:spPr>
+      </p:pic>
+    </p:spTree>
+    <p:extLst>
+      <p:ext uri="{BB962C8B-B14F-4D97-AF65-F5344CB8AC3E}">
+        <p14:creationId xmlns:p14="http://schemas.microsoft.com/office/powerpoint/2010/main" val="2625994921"/>
+      </p:ext>
+    </p:extLst>
+  </p:cSld>
+  <p:clrMapOvr>
+    <a:masterClrMapping/>
+  </p:clrMapOvr>
+</p:sld>
+</file>
+
 <file path=ppt/theme/theme1.xml><?xml version="1.0" encoding="utf-8"?>
 <a:theme xmlns:a="http://schemas.openxmlformats.org/drawingml/2006/main" name="Office Theme">
   <a:themeElements>

</xml_diff>